<commit_message>
Tutorial Laravel + Livewire with Simple CRUD is Done! (2)
</commit_message>
<xml_diff>
--- a/Introduction Laravel Livewire, Advantage of Using Laravel, Tutorial Laravel Livewire.pptx
+++ b/Introduction Laravel Livewire, Advantage of Using Laravel, Tutorial Laravel Livewire.pptx
@@ -12233,14 +12233,34 @@
             <a:r>
               <a:rPr lang="en-US" sz="2800" dirty="0">
                 <a:solidFill>
+                  <a:srgbClr val="FF0000"/>
+                </a:solidFill>
+              </a:rPr>
+              <a:t>LARAVEL</a:t>
+            </a:r>
+            <a:r>
+              <a:rPr lang="en-US" sz="2800" dirty="0">
+                <a:solidFill>
                   <a:srgbClr val="FF33CC"/>
                 </a:solidFill>
               </a:rPr>
-              <a:t>LIVEWIRE </a:t>
+              <a:t> </a:t>
             </a:r>
             <a:r>
               <a:rPr lang="en-US" sz="2800" dirty="0"/>
-              <a:t>FEATURE (DATA BINDING)</a:t>
+              <a:t>+</a:t>
+            </a:r>
+            <a:r>
+              <a:rPr lang="en-US" sz="2800" dirty="0">
+                <a:solidFill>
+                  <a:srgbClr val="FF33CC"/>
+                </a:solidFill>
+              </a:rPr>
+              <a:t> LIVEWIRE </a:t>
+            </a:r>
+            <a:r>
+              <a:rPr lang="en-US" sz="2800" dirty="0"/>
+              <a:t>FINISHED!</a:t>
             </a:r>
             <a:endParaRPr lang="en-GB" sz="2800" dirty="0"/>
           </a:p>
@@ -12277,7 +12297,7 @@
             <a:pPr algn="just"/>
             <a:r>
               <a:rPr lang="en-US" dirty="0"/>
-              <a:t>Okay enough, I’ll update Tomorrow</a:t>
+              <a:t>Yay, Simple CRUD with Livewire is Done!</a:t>
             </a:r>
           </a:p>
           <a:p>
@@ -12292,23 +12312,18 @@
             <a:pPr algn="just"/>
             <a:r>
               <a:rPr lang="en-US" dirty="0"/>
-              <a:t>Source Code </a:t>
-            </a:r>
-            <a:r>
-              <a:rPr lang="en-US"/>
-              <a:t>: </a:t>
-            </a:r>
-            <a:r>
-              <a:rPr lang="en-US">
+              <a:t>Source Code : </a:t>
+            </a:r>
+            <a:r>
+              <a:rPr lang="en-US" dirty="0">
                 <a:hlinkClick r:id="rId2"/>
               </a:rPr>
               <a:t>https://github.com/bernandotorrez/laravel-livewire</a:t>
             </a:r>
             <a:r>
-              <a:rPr lang="en-US"/>
+              <a:rPr lang="en-US" dirty="0"/>
               <a:t> </a:t>
             </a:r>
-            <a:endParaRPr lang="en-US" dirty="0"/>
           </a:p>
         </p:txBody>
       </p:sp>

</xml_diff>